<commit_message>
Atualização material aula 8
</commit_message>
<xml_diff>
--- a/Aula 8/PIC Angular - Aula 8 - Módulos.PPTX
+++ b/Aula 8/PIC Angular - Aula 8 - Módulos.PPTX
@@ -150,7 +150,7 @@
   </p:defaultTextStyle>
   <p:extLst>
     <p:ext uri="{EFAFB233-063F-42B5-8137-9DF3F51BA10A}">
-      <p15:sldGuideLst xmlns:p15="http://schemas.microsoft.com/office/powerpoint/2012/main">
+      <p15:sldGuideLst xmlns:p15="http://schemas.microsoft.com/office/powerpoint/2012/main" xmlns="">
         <p15:guide id="1" orient="horz" pos="2160">
           <p15:clr>
             <a:srgbClr val="A4A3A4"/>
@@ -249,6 +249,7 @@
           <a:p>
             <a:fld id="{4E16BCD9-542D-4D3D-9E0B-2DE32A6AFECE}" type="datetimeFigureOut">
               <a:rPr lang="pt-BR" smtClean="0"/>
+              <a:pPr/>
               <a:t>25/09/2018</a:t>
             </a:fld>
             <a:endParaRPr lang="pt-BR"/>
@@ -407,6 +408,7 @@
           <a:p>
             <a:fld id="{892C67E6-04BB-4F3B-B665-88792C775AC8}" type="slidenum">
               <a:rPr lang="pt-BR" smtClean="0"/>
+              <a:pPr/>
               <a:t>‹nº›</a:t>
             </a:fld>
             <a:endParaRPr lang="pt-BR"/>
@@ -416,7 +418,7 @@
     </p:spTree>
     <p:extLst>
       <p:ext uri="{BB962C8B-B14F-4D97-AF65-F5344CB8AC3E}">
-        <p14:creationId xmlns:p14="http://schemas.microsoft.com/office/powerpoint/2010/main" val="3984565353"/>
+        <p14:creationId xmlns:p14="http://schemas.microsoft.com/office/powerpoint/2010/main" xmlns="" val="3984565353"/>
       </p:ext>
     </p:extLst>
   </p:cSld>
@@ -581,6 +583,7 @@
           <a:p>
             <a:fld id="{892C67E6-04BB-4F3B-B665-88792C775AC8}" type="slidenum">
               <a:rPr lang="pt-BR" smtClean="0"/>
+              <a:pPr/>
               <a:t>1</a:t>
             </a:fld>
             <a:endParaRPr lang="pt-BR"/>
@@ -590,7 +593,7 @@
     </p:spTree>
     <p:extLst>
       <p:ext uri="{BB962C8B-B14F-4D97-AF65-F5344CB8AC3E}">
-        <p14:creationId xmlns:p14="http://schemas.microsoft.com/office/powerpoint/2010/main" val="2441609050"/>
+        <p14:creationId xmlns:p14="http://schemas.microsoft.com/office/powerpoint/2010/main" xmlns="" val="2441609050"/>
       </p:ext>
     </p:extLst>
   </p:cSld>
@@ -665,6 +668,7 @@
           <a:p>
             <a:fld id="{892C67E6-04BB-4F3B-B665-88792C775AC8}" type="slidenum">
               <a:rPr lang="pt-BR" smtClean="0"/>
+              <a:pPr/>
               <a:t>2</a:t>
             </a:fld>
             <a:endParaRPr lang="pt-BR"/>
@@ -674,7 +678,7 @@
     </p:spTree>
     <p:extLst>
       <p:ext uri="{BB962C8B-B14F-4D97-AF65-F5344CB8AC3E}">
-        <p14:creationId xmlns:p14="http://schemas.microsoft.com/office/powerpoint/2010/main" val="1318969157"/>
+        <p14:creationId xmlns:p14="http://schemas.microsoft.com/office/powerpoint/2010/main" xmlns="" val="1318969157"/>
       </p:ext>
     </p:extLst>
   </p:cSld>
@@ -749,6 +753,7 @@
           <a:p>
             <a:fld id="{892C67E6-04BB-4F3B-B665-88792C775AC8}" type="slidenum">
               <a:rPr lang="pt-BR" smtClean="0"/>
+              <a:pPr/>
               <a:t>3</a:t>
             </a:fld>
             <a:endParaRPr lang="pt-BR"/>
@@ -758,7 +763,7 @@
     </p:spTree>
     <p:extLst>
       <p:ext uri="{BB962C8B-B14F-4D97-AF65-F5344CB8AC3E}">
-        <p14:creationId xmlns:p14="http://schemas.microsoft.com/office/powerpoint/2010/main" val="3988449963"/>
+        <p14:creationId xmlns:p14="http://schemas.microsoft.com/office/powerpoint/2010/main" xmlns="" val="3988449963"/>
       </p:ext>
     </p:extLst>
   </p:cSld>
@@ -833,6 +838,7 @@
           <a:p>
             <a:fld id="{892C67E6-04BB-4F3B-B665-88792C775AC8}" type="slidenum">
               <a:rPr lang="pt-BR" smtClean="0"/>
+              <a:pPr/>
               <a:t>4</a:t>
             </a:fld>
             <a:endParaRPr lang="pt-BR"/>
@@ -842,7 +848,7 @@
     </p:spTree>
     <p:extLst>
       <p:ext uri="{BB962C8B-B14F-4D97-AF65-F5344CB8AC3E}">
-        <p14:creationId xmlns:p14="http://schemas.microsoft.com/office/powerpoint/2010/main" val="779278952"/>
+        <p14:creationId xmlns:p14="http://schemas.microsoft.com/office/powerpoint/2010/main" xmlns="" val="779278952"/>
       </p:ext>
     </p:extLst>
   </p:cSld>
@@ -917,6 +923,7 @@
           <a:p>
             <a:fld id="{892C67E6-04BB-4F3B-B665-88792C775AC8}" type="slidenum">
               <a:rPr lang="pt-BR" smtClean="0"/>
+              <a:pPr/>
               <a:t>5</a:t>
             </a:fld>
             <a:endParaRPr lang="pt-BR"/>
@@ -926,7 +933,7 @@
     </p:spTree>
     <p:extLst>
       <p:ext uri="{BB962C8B-B14F-4D97-AF65-F5344CB8AC3E}">
-        <p14:creationId xmlns:p14="http://schemas.microsoft.com/office/powerpoint/2010/main" val="912429746"/>
+        <p14:creationId xmlns:p14="http://schemas.microsoft.com/office/powerpoint/2010/main" xmlns="" val="912429746"/>
       </p:ext>
     </p:extLst>
   </p:cSld>
@@ -27688,7 +27695,7 @@
           <p:cNvPr id="7" name="Imagem 6">
             <a:extLst>
               <a:ext uri="{FF2B5EF4-FFF2-40B4-BE49-F238E27FC236}">
-                <a16:creationId xmlns="" xmlns:a16="http://schemas.microsoft.com/office/drawing/2014/main" id="{E8B7DEF8-F274-4FB1-961E-BE37BD79FEA6}"/>
+                <a16:creationId xmlns:a16="http://schemas.microsoft.com/office/drawing/2014/main" xmlns="" id="{E8B7DEF8-F274-4FB1-961E-BE37BD79FEA6}"/>
               </a:ext>
             </a:extLst>
           </p:cNvPr>
@@ -27724,7 +27731,7 @@
           <a:blip r:embed="rId5">
             <a:extLst>
               <a:ext uri="{28A0092B-C50C-407E-A947-70E740481C1C}">
-                <a14:useLocalDpi xmlns:a14="http://schemas.microsoft.com/office/drawing/2010/main" val="0"/>
+                <a14:useLocalDpi xmlns:a14="http://schemas.microsoft.com/office/drawing/2010/main" xmlns="" val="0"/>
               </a:ext>
             </a:extLst>
           </a:blip>
@@ -27844,7 +27851,7 @@
           <p:cNvPr id="7" name="Imagem 6">
             <a:extLst>
               <a:ext uri="{FF2B5EF4-FFF2-40B4-BE49-F238E27FC236}">
-                <a16:creationId xmlns="" xmlns:a16="http://schemas.microsoft.com/office/drawing/2014/main" id="{E8B7DEF8-F274-4FB1-961E-BE37BD79FEA6}"/>
+                <a16:creationId xmlns:a16="http://schemas.microsoft.com/office/drawing/2014/main" xmlns="" id="{E8B7DEF8-F274-4FB1-961E-BE37BD79FEA6}"/>
               </a:ext>
             </a:extLst>
           </p:cNvPr>
@@ -27959,15 +27966,19 @@
             </a:pPr>
             <a:r>
               <a:rPr lang="pt-BR" sz="2800" dirty="0" smtClean="0"/>
-              <a:t>Organiza a </a:t>
-            </a:r>
-            <a:r>
-              <a:rPr lang="pt-BR" sz="2800" dirty="0" err="1" smtClean="0"/>
-              <a:t>estruta</a:t>
+              <a:t>Organiza </a:t>
+            </a:r>
+            <a:r>
+              <a:rPr lang="pt-BR" sz="2800" smtClean="0"/>
+              <a:t>a </a:t>
+            </a:r>
+            <a:r>
+              <a:rPr lang="pt-BR" sz="2800" smtClean="0"/>
+              <a:t>estrutura </a:t>
             </a:r>
             <a:r>
               <a:rPr lang="pt-BR" sz="2800" dirty="0" smtClean="0"/>
-              <a:t> do projeto em médias e grandes aplicações;</a:t>
+              <a:t>do projeto em médias e grandes aplicações;</a:t>
             </a:r>
           </a:p>
           <a:p>
@@ -28030,7 +28041,7 @@
     </p:spTree>
     <p:extLst>
       <p:ext uri="{BB962C8B-B14F-4D97-AF65-F5344CB8AC3E}">
-        <p14:creationId xmlns:p14="http://schemas.microsoft.com/office/powerpoint/2010/main" val="2980370885"/>
+        <p14:creationId xmlns:p14="http://schemas.microsoft.com/office/powerpoint/2010/main" xmlns="" val="2980370885"/>
       </p:ext>
     </p:extLst>
   </p:cSld>
@@ -28095,7 +28106,7 @@
           <p:cNvPr id="7" name="Imagem 6">
             <a:extLst>
               <a:ext uri="{FF2B5EF4-FFF2-40B4-BE49-F238E27FC236}">
-                <a16:creationId xmlns="" xmlns:a16="http://schemas.microsoft.com/office/drawing/2014/main" id="{E8B7DEF8-F274-4FB1-961E-BE37BD79FEA6}"/>
+                <a16:creationId xmlns:a16="http://schemas.microsoft.com/office/drawing/2014/main" xmlns="" id="{E8B7DEF8-F274-4FB1-961E-BE37BD79FEA6}"/>
               </a:ext>
             </a:extLst>
           </p:cNvPr>
@@ -28310,7 +28321,7 @@
     </p:spTree>
     <p:extLst>
       <p:ext uri="{BB962C8B-B14F-4D97-AF65-F5344CB8AC3E}">
-        <p14:creationId xmlns:p14="http://schemas.microsoft.com/office/powerpoint/2010/main" val="508311768"/>
+        <p14:creationId xmlns:p14="http://schemas.microsoft.com/office/powerpoint/2010/main" xmlns="" val="508311768"/>
       </p:ext>
     </p:extLst>
   </p:cSld>
@@ -28375,7 +28386,7 @@
           <p:cNvPr id="7" name="Imagem 6">
             <a:extLst>
               <a:ext uri="{FF2B5EF4-FFF2-40B4-BE49-F238E27FC236}">
-                <a16:creationId xmlns="" xmlns:a16="http://schemas.microsoft.com/office/drawing/2014/main" id="{E8B7DEF8-F274-4FB1-961E-BE37BD79FEA6}"/>
+                <a16:creationId xmlns:a16="http://schemas.microsoft.com/office/drawing/2014/main" xmlns="" id="{E8B7DEF8-F274-4FB1-961E-BE37BD79FEA6}"/>
               </a:ext>
             </a:extLst>
           </p:cNvPr>
@@ -28541,7 +28552,7 @@
     </p:spTree>
     <p:extLst>
       <p:ext uri="{BB962C8B-B14F-4D97-AF65-F5344CB8AC3E}">
-        <p14:creationId xmlns:p14="http://schemas.microsoft.com/office/powerpoint/2010/main" val="2888406244"/>
+        <p14:creationId xmlns:p14="http://schemas.microsoft.com/office/powerpoint/2010/main" xmlns="" val="2888406244"/>
       </p:ext>
     </p:extLst>
   </p:cSld>
@@ -28606,7 +28617,7 @@
           <p:cNvPr id="7" name="Imagem 6">
             <a:extLst>
               <a:ext uri="{FF2B5EF4-FFF2-40B4-BE49-F238E27FC236}">
-                <a16:creationId xmlns="" xmlns:a16="http://schemas.microsoft.com/office/drawing/2014/main" id="{E8B7DEF8-F274-4FB1-961E-BE37BD79FEA6}"/>
+                <a16:creationId xmlns:a16="http://schemas.microsoft.com/office/drawing/2014/main" xmlns="" id="{E8B7DEF8-F274-4FB1-961E-BE37BD79FEA6}"/>
               </a:ext>
             </a:extLst>
           </p:cNvPr>
@@ -28747,13 +28758,7 @@
               <a:rPr lang="pt-BR" dirty="0">
                 <a:hlinkClick r:id="rId5"/>
               </a:rPr>
-              <a:t>://</a:t>
-            </a:r>
-            <a:r>
-              <a:rPr lang="pt-BR" dirty="0">
-                <a:hlinkClick r:id="rId5"/>
-              </a:rPr>
-              <a:t>angular.io/guide/lazy-loading-ngmodules</a:t>
+              <a:t>://angular.io/guide/lazy-loading-ngmodules</a:t>
             </a:r>
             <a:endParaRPr lang="pt-BR" dirty="0"/>
           </a:p>
@@ -28954,7 +28959,7 @@
     </p:spTree>
     <p:extLst>
       <p:ext uri="{BB962C8B-B14F-4D97-AF65-F5344CB8AC3E}">
-        <p14:creationId xmlns:p14="http://schemas.microsoft.com/office/powerpoint/2010/main" val="4136118521"/>
+        <p14:creationId xmlns:p14="http://schemas.microsoft.com/office/powerpoint/2010/main" xmlns="" val="4136118521"/>
       </p:ext>
     </p:extLst>
   </p:cSld>
@@ -31574,7 +31579,7 @@
     </a:clrScheme>
     <a:fontScheme name="Escritório">
       <a:majorFont>
-        <a:latin typeface="Calibri Light" panose="020F0302020204030204"/>
+        <a:latin typeface="Calibri Light"/>
         <a:ea typeface=""/>
         <a:cs typeface=""/>
         <a:font script="Jpan" typeface="ＭＳ Ｐゴシック"/>
@@ -31609,7 +31614,7 @@
         <a:font script="Geor" typeface="Sylfaen"/>
       </a:majorFont>
       <a:minorFont>
-        <a:latin typeface="Calibri" panose="020F0502020204030204"/>
+        <a:latin typeface="Calibri"/>
         <a:ea typeface=""/>
         <a:cs typeface=""/>
         <a:font script="Jpan" typeface="ＭＳ Ｐゴシック"/>
@@ -31786,7 +31791,7 @@
   <a:extraClrSchemeLst/>
   <a:extLst>
     <a:ext uri="{05A4C25C-085E-4340-85A3-A5531E510DB2}">
-      <thm15:themeFamily xmlns:thm15="http://schemas.microsoft.com/office/thememl/2012/main" name="Office Theme" id="{62F939B6-93AF-4DB8-9C6B-D6C7DFDC589F}" vid="{4A3C46E8-61CC-4603-A589-7422A47A8E4A}"/>
+      <thm15:themeFamily xmlns:thm15="http://schemas.microsoft.com/office/thememl/2012/main" xmlns="" name="Office Theme" id="{62F939B6-93AF-4DB8-9C6B-D6C7DFDC589F}" vid="{4A3C46E8-61CC-4603-A589-7422A47A8E4A}"/>
     </a:ext>
   </a:extLst>
 </a:theme>

</xml_diff>